<commit_message>
chore: update verso-4a.pptx template file
</commit_message>
<xml_diff>
--- a/public/templates/verso-4a.pptx
+++ b/public/templates/verso-4a.pptx
@@ -276,7 +276,7 @@
           <a:p>
             <a:fld id="{62DE8017-325E-4800-BDDD-E3855642CAE0}" type="datetimeFigureOut">
               <a:rPr lang="pt-BR" smtClean="0"/>
-              <a:t>14/02/2025</a:t>
+              <a:t>23/03/2025</a:t>
             </a:fld>
             <a:endParaRPr lang="pt-BR"/>
           </a:p>
@@ -486,7 +486,7 @@
           <a:p>
             <a:fld id="{62DE8017-325E-4800-BDDD-E3855642CAE0}" type="datetimeFigureOut">
               <a:rPr lang="pt-BR" smtClean="0"/>
-              <a:t>14/02/2025</a:t>
+              <a:t>23/03/2025</a:t>
             </a:fld>
             <a:endParaRPr lang="pt-BR"/>
           </a:p>
@@ -696,7 +696,7 @@
           <a:p>
             <a:fld id="{62DE8017-325E-4800-BDDD-E3855642CAE0}" type="datetimeFigureOut">
               <a:rPr lang="pt-BR" smtClean="0"/>
-              <a:t>14/02/2025</a:t>
+              <a:t>23/03/2025</a:t>
             </a:fld>
             <a:endParaRPr lang="pt-BR"/>
           </a:p>
@@ -906,7 +906,7 @@
           <a:p>
             <a:fld id="{62DE8017-325E-4800-BDDD-E3855642CAE0}" type="datetimeFigureOut">
               <a:rPr lang="pt-BR" smtClean="0"/>
-              <a:t>14/02/2025</a:t>
+              <a:t>23/03/2025</a:t>
             </a:fld>
             <a:endParaRPr lang="pt-BR"/>
           </a:p>
@@ -1180,7 +1180,7 @@
           <a:p>
             <a:fld id="{62DE8017-325E-4800-BDDD-E3855642CAE0}" type="datetimeFigureOut">
               <a:rPr lang="pt-BR" smtClean="0"/>
-              <a:t>14/02/2025</a:t>
+              <a:t>23/03/2025</a:t>
             </a:fld>
             <a:endParaRPr lang="pt-BR"/>
           </a:p>
@@ -1450,7 +1450,7 @@
           <a:p>
             <a:fld id="{62DE8017-325E-4800-BDDD-E3855642CAE0}" type="datetimeFigureOut">
               <a:rPr lang="pt-BR" smtClean="0"/>
-              <a:t>14/02/2025</a:t>
+              <a:t>23/03/2025</a:t>
             </a:fld>
             <a:endParaRPr lang="pt-BR"/>
           </a:p>
@@ -1856,7 +1856,7 @@
           <a:p>
             <a:fld id="{62DE8017-325E-4800-BDDD-E3855642CAE0}" type="datetimeFigureOut">
               <a:rPr lang="pt-BR" smtClean="0"/>
-              <a:t>14/02/2025</a:t>
+              <a:t>23/03/2025</a:t>
             </a:fld>
             <a:endParaRPr lang="pt-BR"/>
           </a:p>
@@ -2006,7 +2006,7 @@
           <a:p>
             <a:fld id="{62DE8017-325E-4800-BDDD-E3855642CAE0}" type="datetimeFigureOut">
               <a:rPr lang="pt-BR" smtClean="0"/>
-              <a:t>14/02/2025</a:t>
+              <a:t>23/03/2025</a:t>
             </a:fld>
             <a:endParaRPr lang="pt-BR"/>
           </a:p>
@@ -2125,7 +2125,7 @@
           <a:p>
             <a:fld id="{62DE8017-325E-4800-BDDD-E3855642CAE0}" type="datetimeFigureOut">
               <a:rPr lang="pt-BR" smtClean="0"/>
-              <a:t>14/02/2025</a:t>
+              <a:t>23/03/2025</a:t>
             </a:fld>
             <a:endParaRPr lang="pt-BR"/>
           </a:p>
@@ -2435,7 +2435,7 @@
           <a:p>
             <a:fld id="{62DE8017-325E-4800-BDDD-E3855642CAE0}" type="datetimeFigureOut">
               <a:rPr lang="pt-BR" smtClean="0"/>
-              <a:t>14/02/2025</a:t>
+              <a:t>23/03/2025</a:t>
             </a:fld>
             <a:endParaRPr lang="pt-BR"/>
           </a:p>
@@ -2725,7 +2725,7 @@
           <a:p>
             <a:fld id="{62DE8017-325E-4800-BDDD-E3855642CAE0}" type="datetimeFigureOut">
               <a:rPr lang="pt-BR" smtClean="0"/>
-              <a:t>14/02/2025</a:t>
+              <a:t>23/03/2025</a:t>
             </a:fld>
             <a:endParaRPr lang="pt-BR"/>
           </a:p>
@@ -3372,8 +3372,8 @@
         </p:nvSpPr>
         <p:spPr bwMode="auto">
           <a:xfrm>
-            <a:off x="421549" y="1762460"/>
-            <a:ext cx="4487883" cy="246221"/>
+            <a:off x="405190" y="1755305"/>
+            <a:ext cx="9008486" cy="246221"/>
           </a:xfrm>
           <a:prstGeom prst="rect">
             <a:avLst/>
@@ -3387,33 +3387,33 @@
           </a:ln>
         </p:spPr>
         <p:txBody>
-          <a:bodyPr rot="0" vert="horz" wrap="square" lIns="91440" tIns="45720" rIns="91440" bIns="45720" anchor="t" anchorCtr="0">
+          <a:bodyPr rot="0" vert="horz" wrap="square" lIns="91440" tIns="45720" rIns="91440" bIns="45720" numCol="2" anchor="t" anchorCtr="0">
             <a:spAutoFit/>
           </a:bodyPr>
           <a:lstStyle/>
           <a:p>
             <a:r>
-              <a:rPr lang="pt-BR" sz="1000" b="1" dirty="0">
+              <a:rPr lang="pt-BR" sz="1000" dirty="0">
                 <a:latin typeface="Arial"/>
                 <a:cs typeface="Arial"/>
               </a:rPr>
               <a:t>[</a:t>
             </a:r>
             <a:r>
-              <a:rPr lang="pt-BR" sz="1000" b="1" dirty="0" err="1">
+              <a:rPr lang="pt-BR" sz="1000" dirty="0" err="1">
                 <a:latin typeface="Arial"/>
                 <a:cs typeface="Arial"/>
               </a:rPr>
               <a:t>conteudo</a:t>
             </a:r>
             <a:r>
-              <a:rPr lang="pt-BR" sz="1000" b="1" dirty="0">
+              <a:rPr lang="pt-BR" sz="1000" dirty="0">
                 <a:latin typeface="Arial"/>
                 <a:cs typeface="Arial"/>
               </a:rPr>
               <a:t>]</a:t>
             </a:r>
-            <a:endParaRPr lang="pt-BR" sz="1000" b="1" dirty="0">
+            <a:endParaRPr lang="pt-BR" sz="1000" dirty="0">
               <a:latin typeface="Arial" panose="020B0604020202020204" pitchFamily="34" charset="0"/>
               <a:cs typeface="Arial" panose="020B0604020202020204" pitchFamily="34" charset="0"/>
             </a:endParaRPr>
@@ -3428,8 +3428,8 @@
         </p:nvSpPr>
         <p:spPr>
           <a:xfrm>
-            <a:off x="421550" y="3646250"/>
-            <a:ext cx="2232000" cy="954107"/>
+            <a:off x="421550" y="3966461"/>
+            <a:ext cx="2232000" cy="984885"/>
           </a:xfrm>
           <a:prstGeom prst="rect">
             <a:avLst/>
@@ -3450,11 +3450,18 @@
           <a:p>
             <a:pPr algn="ctr"/>
             <a:r>
+              <a:rPr lang="pt-BR" sz="800" b="1" dirty="0">
+                <a:latin typeface="Arial"/>
+                <a:cs typeface="Arial"/>
+              </a:rPr>
+              <a:t>[assinatura_4</a:t>
+            </a:r>
+            <a:r>
               <a:rPr lang="pt-BR" sz="700" b="1" dirty="0">
                 <a:latin typeface="Arial"/>
                 <a:cs typeface="Arial"/>
               </a:rPr>
-              <a:t>[assinatura_4]</a:t>
+              <a:t>]</a:t>
             </a:r>
             <a:endParaRPr lang="pt-BR" dirty="0"/>
           </a:p>
@@ -3465,6 +3472,49 @@
             </a:endParaRPr>
           </a:p>
           <a:p>
+            <a:pPr algn="ctr"/>
+            <a:r>
+              <a:rPr lang="pt-BR" sz="700" dirty="0">
+                <a:latin typeface="Arial" panose="020B0604020202020204" pitchFamily="34" charset="0"/>
+                <a:cs typeface="Arial" panose="020B0604020202020204" pitchFamily="34" charset="0"/>
+              </a:rPr>
+              <a:t>_________________________________________</a:t>
+            </a:r>
+          </a:p>
+          <a:p>
+            <a:pPr algn="ctr"/>
+            <a:r>
+              <a:rPr lang="pt-BR" sz="800" b="1" dirty="0">
+                <a:latin typeface="Arial"/>
+                <a:cs typeface="Arial"/>
+              </a:rPr>
+              <a:t>[nome4]</a:t>
+            </a:r>
+            <a:endParaRPr lang="pt-BR" sz="800" dirty="0"/>
+          </a:p>
+          <a:p>
+            <a:pPr algn="ctr"/>
+            <a:r>
+              <a:rPr lang="pt-BR" sz="700" dirty="0">
+                <a:latin typeface="Arial"/>
+                <a:cs typeface="Arial"/>
+              </a:rPr>
+              <a:t>[qualificacao_profissional4]</a:t>
+            </a:r>
+          </a:p>
+          <a:p>
+            <a:pPr algn="ctr"/>
+            <a:r>
+              <a:rPr lang="pt-BR" sz="700" dirty="0">
+                <a:latin typeface="Arial"/>
+                <a:cs typeface="Arial"/>
+              </a:rPr>
+              <a:t>[registro_qualificacao4]</a:t>
+            </a:r>
+            <a:endParaRPr lang="pt-BR" sz="800" dirty="0"/>
+          </a:p>
+          <a:p>
+            <a:pPr algn="ctr"/>
             <a:endParaRPr lang="pt-BR" sz="700" dirty="0">
               <a:latin typeface="Arial" panose="020B0604020202020204" pitchFamily="34" charset="0"/>
               <a:cs typeface="Arial" panose="020B0604020202020204" pitchFamily="34" charset="0"/>
@@ -3475,48 +3525,6 @@
               <a:latin typeface="Arial" panose="020B0604020202020204" pitchFamily="34" charset="0"/>
               <a:cs typeface="Arial" panose="020B0604020202020204" pitchFamily="34" charset="0"/>
             </a:endParaRPr>
-          </a:p>
-          <a:p>
-            <a:pPr algn="ctr"/>
-            <a:r>
-              <a:rPr lang="pt-BR" sz="700" dirty="0">
-                <a:latin typeface="Arial" panose="020B0604020202020204" pitchFamily="34" charset="0"/>
-                <a:cs typeface="Arial" panose="020B0604020202020204" pitchFamily="34" charset="0"/>
-              </a:rPr>
-              <a:t>_________________________________________</a:t>
-            </a:r>
-          </a:p>
-          <a:p>
-            <a:pPr algn="ctr"/>
-            <a:r>
-              <a:rPr lang="pt-BR" sz="700" b="1" dirty="0">
-                <a:latin typeface="Arial"/>
-                <a:cs typeface="Arial"/>
-              </a:rPr>
-              <a:t>[nome4]</a:t>
-            </a:r>
-            <a:endParaRPr lang="pt-BR" dirty="0"/>
-          </a:p>
-          <a:p>
-            <a:pPr algn="ctr"/>
-            <a:r>
-              <a:rPr lang="pt-BR" sz="700" dirty="0">
-                <a:latin typeface="Arial"/>
-                <a:cs typeface="Arial"/>
-              </a:rPr>
-              <a:t>[qualificacao_profissional4]</a:t>
-            </a:r>
-          </a:p>
-          <a:p>
-            <a:pPr algn="ctr"/>
-            <a:r>
-              <a:rPr lang="pt-BR" sz="700" dirty="0">
-                <a:latin typeface="Arial"/>
-                <a:cs typeface="Arial"/>
-              </a:rPr>
-              <a:t>[registro_profissional4]</a:t>
-            </a:r>
-            <a:endParaRPr lang="pt-BR" dirty="0"/>
           </a:p>
         </p:txBody>
       </p:sp>
@@ -3591,7 +3599,7 @@
         </p:nvSpPr>
         <p:spPr>
           <a:xfrm>
-            <a:off x="3552486" y="4882633"/>
+            <a:off x="3552486" y="5055727"/>
             <a:ext cx="2713892" cy="415498"/>
           </a:xfrm>
           <a:prstGeom prst="rect">
@@ -3677,8 +3685,8 @@
         </p:nvSpPr>
         <p:spPr>
           <a:xfrm>
-            <a:off x="4935597" y="3646249"/>
-            <a:ext cx="2232000" cy="954107"/>
+            <a:off x="4935597" y="3966461"/>
+            <a:ext cx="2232000" cy="984885"/>
           </a:xfrm>
           <a:prstGeom prst="rect">
             <a:avLst/>
@@ -3699,13 +3707,13 @@
           <a:p>
             <a:pPr algn="ctr"/>
             <a:r>
-              <a:rPr lang="pt-BR" sz="700" b="1" dirty="0">
+              <a:rPr lang="pt-BR" sz="800" b="1" dirty="0">
                 <a:latin typeface="Arial"/>
                 <a:cs typeface="Arial"/>
               </a:rPr>
               <a:t>[assinatura_2]</a:t>
             </a:r>
-            <a:endParaRPr lang="pt-BR" dirty="0"/>
+            <a:endParaRPr lang="pt-BR" sz="800" dirty="0"/>
           </a:p>
           <a:p>
             <a:pPr algn="ctr"/>
@@ -3716,7 +3724,48 @@
           </a:p>
           <a:p>
             <a:pPr algn="ctr"/>
-            <a:endParaRPr lang="pt-BR" sz="700" dirty="0">
+            <a:r>
+              <a:rPr lang="pt-BR" sz="700" dirty="0">
+                <a:latin typeface="Arial" panose="020B0604020202020204" pitchFamily="34" charset="0"/>
+                <a:cs typeface="Arial" panose="020B0604020202020204" pitchFamily="34" charset="0"/>
+              </a:rPr>
+              <a:t>_________________________________________</a:t>
+            </a:r>
+          </a:p>
+          <a:p>
+            <a:pPr algn="ctr"/>
+            <a:r>
+              <a:rPr lang="pt-BR" sz="800" b="1" dirty="0">
+                <a:latin typeface="Arial"/>
+                <a:cs typeface="Arial"/>
+              </a:rPr>
+              <a:t>[nome2]</a:t>
+            </a:r>
+            <a:endParaRPr lang="pt-BR" sz="800" b="1" dirty="0">
+              <a:latin typeface="Arial" panose="020B0604020202020204" pitchFamily="34" charset="0"/>
+              <a:cs typeface="Arial" panose="020B0604020202020204" pitchFamily="34" charset="0"/>
+            </a:endParaRPr>
+          </a:p>
+          <a:p>
+            <a:pPr algn="ctr"/>
+            <a:r>
+              <a:rPr lang="pt-BR" sz="700" dirty="0">
+                <a:latin typeface="Arial"/>
+                <a:cs typeface="Arial"/>
+              </a:rPr>
+              <a:t>[qualificacao_profissional2]</a:t>
+            </a:r>
+          </a:p>
+          <a:p>
+            <a:pPr algn="ctr"/>
+            <a:r>
+              <a:rPr lang="pt-BR" sz="700" b="0" dirty="0">
+                <a:latin typeface="Arial"/>
+                <a:cs typeface="Arial"/>
+              </a:rPr>
+              <a:t>[registro_qualificacao2]</a:t>
+            </a:r>
+            <a:endParaRPr lang="pt-BR" sz="700" b="0" dirty="0">
               <a:latin typeface="Arial" panose="020B0604020202020204" pitchFamily="34" charset="0"/>
               <a:cs typeface="Arial" panose="020B0604020202020204" pitchFamily="34" charset="0"/>
             </a:endParaRPr>
@@ -3730,52 +3779,7 @@
           </a:p>
           <a:p>
             <a:pPr algn="ctr"/>
-            <a:r>
-              <a:rPr lang="pt-BR" sz="700" dirty="0">
-                <a:latin typeface="Arial" panose="020B0604020202020204" pitchFamily="34" charset="0"/>
-                <a:cs typeface="Arial" panose="020B0604020202020204" pitchFamily="34" charset="0"/>
-              </a:rPr>
-              <a:t>_________________________________________</a:t>
-            </a:r>
-          </a:p>
-          <a:p>
-            <a:pPr algn="ctr"/>
-            <a:r>
-              <a:rPr lang="pt-BR" sz="700" b="1" dirty="0">
-                <a:latin typeface="Arial"/>
-                <a:cs typeface="Arial"/>
-              </a:rPr>
-              <a:t>[nome2]</a:t>
-            </a:r>
-            <a:endParaRPr lang="pt-BR" sz="700" b="1" dirty="0">
-              <a:latin typeface="Arial" panose="020B0604020202020204" pitchFamily="34" charset="0"/>
-              <a:cs typeface="Arial" panose="020B0604020202020204" pitchFamily="34" charset="0"/>
-            </a:endParaRPr>
-          </a:p>
-          <a:p>
-            <a:pPr algn="ctr"/>
-            <a:r>
-              <a:rPr lang="pt-BR" sz="700" dirty="0">
-                <a:latin typeface="Arial"/>
-                <a:cs typeface="Arial"/>
-              </a:rPr>
-              <a:t>[qualificacao_profissional2]</a:t>
-            </a:r>
-            <a:endParaRPr lang="pt-BR" sz="700" b="0" dirty="0">
-              <a:latin typeface="Arial" panose="020B0604020202020204" pitchFamily="34" charset="0"/>
-              <a:cs typeface="Arial" panose="020B0604020202020204" pitchFamily="34" charset="0"/>
-            </a:endParaRPr>
-          </a:p>
-          <a:p>
-            <a:pPr algn="ctr"/>
-            <a:r>
-              <a:rPr lang="pt-BR" sz="700" dirty="0">
-                <a:latin typeface="Arial"/>
-                <a:cs typeface="Arial"/>
-              </a:rPr>
-              <a:t>[registro_profissional2]</a:t>
-            </a:r>
-            <a:endParaRPr lang="pt-BR" sz="700" b="0" dirty="0">
+            <a:endParaRPr lang="pt-BR" sz="700" dirty="0">
               <a:latin typeface="Arial" panose="020B0604020202020204" pitchFamily="34" charset="0"/>
               <a:cs typeface="Arial" panose="020B0604020202020204" pitchFamily="34" charset="0"/>
             </a:endParaRPr>
@@ -3796,7 +3800,7 @@
         </p:nvSpPr>
         <p:spPr>
           <a:xfrm>
-            <a:off x="2721069" y="5376142"/>
+            <a:off x="2721069" y="5529258"/>
             <a:ext cx="4429056" cy="307777"/>
           </a:xfrm>
           <a:prstGeom prst="rect">
@@ -3863,8 +3867,8 @@
         </p:nvSpPr>
         <p:spPr>
           <a:xfrm>
-            <a:off x="7198035" y="3646241"/>
-            <a:ext cx="2232000" cy="954107"/>
+            <a:off x="7198035" y="3966461"/>
+            <a:ext cx="2232000" cy="984885"/>
           </a:xfrm>
           <a:prstGeom prst="rect">
             <a:avLst/>
@@ -3885,13 +3889,13 @@
           <a:p>
             <a:pPr algn="ctr"/>
             <a:r>
-              <a:rPr lang="pt-BR" sz="700" b="1" dirty="0">
+              <a:rPr lang="pt-BR" sz="800" b="1" dirty="0">
                 <a:latin typeface="Arial"/>
                 <a:cs typeface="Arial"/>
               </a:rPr>
               <a:t>[assinatura_1]</a:t>
             </a:r>
-            <a:endParaRPr lang="pt-BR" dirty="0"/>
+            <a:endParaRPr lang="pt-BR" sz="800" dirty="0"/>
           </a:p>
           <a:p>
             <a:pPr algn="ctr"/>
@@ -3902,10 +3906,44 @@
           </a:p>
           <a:p>
             <a:pPr algn="ctr"/>
-            <a:endParaRPr lang="pt-BR" sz="700" b="1" dirty="0">
-              <a:latin typeface="Arial" panose="020B0604020202020204" pitchFamily="34" charset="0"/>
-              <a:cs typeface="Arial" panose="020B0604020202020204" pitchFamily="34" charset="0"/>
-            </a:endParaRPr>
+            <a:r>
+              <a:rPr lang="pt-BR" sz="700" dirty="0">
+                <a:latin typeface="Arial" panose="020B0604020202020204" pitchFamily="34" charset="0"/>
+                <a:cs typeface="Arial" panose="020B0604020202020204" pitchFamily="34" charset="0"/>
+              </a:rPr>
+              <a:t>_________________________________________</a:t>
+            </a:r>
+          </a:p>
+          <a:p>
+            <a:pPr algn="ctr"/>
+            <a:r>
+              <a:rPr lang="pt-BR" sz="800" b="1" dirty="0">
+                <a:latin typeface="Arial"/>
+                <a:cs typeface="Arial"/>
+              </a:rPr>
+              <a:t>[nome1]</a:t>
+            </a:r>
+            <a:endParaRPr lang="pt-BR" sz="800" dirty="0"/>
+          </a:p>
+          <a:p>
+            <a:pPr algn="ctr"/>
+            <a:r>
+              <a:rPr lang="pt-BR" sz="700" dirty="0">
+                <a:latin typeface="Arial"/>
+                <a:cs typeface="Arial"/>
+              </a:rPr>
+              <a:t>[qualificacao_profissional1]</a:t>
+            </a:r>
+          </a:p>
+          <a:p>
+            <a:pPr algn="ctr"/>
+            <a:r>
+              <a:rPr lang="pt-BR" sz="700" dirty="0">
+                <a:latin typeface="Arial"/>
+                <a:cs typeface="Arial"/>
+              </a:rPr>
+              <a:t>[registro_qualificacao1]</a:t>
+            </a:r>
           </a:p>
           <a:p>
             <a:pPr algn="ctr"/>
@@ -3916,52 +3954,10 @@
           </a:p>
           <a:p>
             <a:pPr algn="ctr"/>
-            <a:r>
-              <a:rPr lang="pt-BR" sz="700" dirty="0">
-                <a:latin typeface="Arial" panose="020B0604020202020204" pitchFamily="34" charset="0"/>
-                <a:cs typeface="Arial" panose="020B0604020202020204" pitchFamily="34" charset="0"/>
-              </a:rPr>
-              <a:t>_________________________________________</a:t>
-            </a:r>
-          </a:p>
-          <a:p>
-            <a:pPr algn="ctr"/>
-            <a:r>
-              <a:rPr lang="pt-BR" sz="700" b="1" dirty="0">
-                <a:latin typeface="Arial"/>
-                <a:cs typeface="Arial"/>
-              </a:rPr>
-              <a:t>[nome1]</a:t>
-            </a:r>
-            <a:endParaRPr lang="pt-BR" dirty="0"/>
-          </a:p>
-          <a:p>
-            <a:pPr algn="ctr"/>
-            <a:r>
-              <a:rPr lang="pt-BR" sz="700">
-                <a:latin typeface="Arial"/>
-                <a:cs typeface="Arial"/>
-              </a:rPr>
-              <a:t>[qualificacao</a:t>
-            </a:r>
-            <a:r>
-              <a:rPr lang="pt-BR" sz="700" dirty="0">
-                <a:latin typeface="Arial"/>
-                <a:cs typeface="Arial"/>
-              </a:rPr>
-              <a:t>_profissional1]</a:t>
-            </a:r>
-          </a:p>
-          <a:p>
-            <a:pPr algn="ctr"/>
-            <a:r>
-              <a:rPr lang="pt-BR" sz="700" dirty="0">
-                <a:latin typeface="Arial"/>
-                <a:cs typeface="Arial"/>
-              </a:rPr>
-              <a:t>[registro_profissional1]</a:t>
-            </a:r>
-            <a:endParaRPr lang="pt-BR" dirty="0"/>
+            <a:endParaRPr lang="pt-BR" sz="700" b="1" dirty="0">
+              <a:latin typeface="Arial" panose="020B0604020202020204" pitchFamily="34" charset="0"/>
+              <a:cs typeface="Arial" panose="020B0604020202020204" pitchFamily="34" charset="0"/>
+            </a:endParaRPr>
           </a:p>
         </p:txBody>
       </p:sp>
@@ -4080,6 +4076,16 @@
               <a:t>rmacao</a:t>
             </a:r>
             <a:r>
+              <a:rPr lang="pt-BR" sz="1200" b="1" dirty="0">
+                <a:solidFill>
+                  <a:srgbClr val="000000"/>
+                </a:solidFill>
+                <a:latin typeface="Arial"/>
+                <a:cs typeface="Arial"/>
+              </a:rPr>
+              <a:t>]</a:t>
+            </a:r>
+            <a:r>
               <a:rPr lang="pt-BR" sz="900" b="1" dirty="0">
                 <a:solidFill>
                   <a:srgbClr val="000000"/>
@@ -4087,7 +4093,7 @@
                 <a:latin typeface="Arial"/>
                 <a:cs typeface="Arial"/>
               </a:rPr>
-              <a:t>] </a:t>
+              <a:t> </a:t>
             </a:r>
             <a:r>
               <a:rPr lang="pt-BR" sz="1200" b="1" dirty="0">
@@ -4168,8 +4174,8 @@
         </p:nvSpPr>
         <p:spPr>
           <a:xfrm>
-            <a:off x="2668741" y="3646241"/>
-            <a:ext cx="2240692" cy="954107"/>
+            <a:off x="2668741" y="3966461"/>
+            <a:ext cx="2240692" cy="984885"/>
           </a:xfrm>
           <a:prstGeom prst="rect">
             <a:avLst/>
@@ -4190,13 +4196,13 @@
           <a:p>
             <a:pPr algn="ctr"/>
             <a:r>
-              <a:rPr lang="pt-BR" sz="700" b="1" dirty="0">
+              <a:rPr lang="pt-BR" sz="800" b="1" dirty="0">
                 <a:latin typeface="Arial"/>
                 <a:cs typeface="Arial"/>
               </a:rPr>
               <a:t>[assinatura_3]</a:t>
             </a:r>
-            <a:endParaRPr lang="pt-BR" dirty="0"/>
+            <a:endParaRPr lang="pt-BR" sz="800" dirty="0"/>
           </a:p>
           <a:p>
             <a:pPr algn="ctr"/>
@@ -4207,10 +4213,43 @@
           </a:p>
           <a:p>
             <a:pPr algn="ctr"/>
-            <a:endParaRPr lang="pt-BR" sz="700" b="1" dirty="0">
-              <a:latin typeface="Arial" panose="020B0604020202020204" pitchFamily="34" charset="0"/>
-              <a:cs typeface="Arial" panose="020B0604020202020204" pitchFamily="34" charset="0"/>
-            </a:endParaRPr>
+            <a:r>
+              <a:rPr lang="pt-BR" sz="700" dirty="0">
+                <a:latin typeface="Arial" panose="020B0604020202020204" pitchFamily="34" charset="0"/>
+                <a:cs typeface="Arial" panose="020B0604020202020204" pitchFamily="34" charset="0"/>
+              </a:rPr>
+              <a:t>_________________________________________</a:t>
+            </a:r>
+          </a:p>
+          <a:p>
+            <a:pPr algn="ctr"/>
+            <a:r>
+              <a:rPr lang="es-ES" sz="800" b="1" dirty="0">
+                <a:latin typeface="Arial"/>
+                <a:cs typeface="Arial"/>
+              </a:rPr>
+              <a:t>[nome3]</a:t>
+            </a:r>
+          </a:p>
+          <a:p>
+            <a:pPr algn="ctr"/>
+            <a:r>
+              <a:rPr lang="pt-BR" sz="700" dirty="0">
+                <a:latin typeface="Arial"/>
+                <a:cs typeface="Arial"/>
+              </a:rPr>
+              <a:t>[qualificacao_profissional3]</a:t>
+            </a:r>
+          </a:p>
+          <a:p>
+            <a:pPr algn="ctr"/>
+            <a:r>
+              <a:rPr lang="pt-BR" sz="700" dirty="0">
+                <a:latin typeface="Arial"/>
+                <a:cs typeface="Arial"/>
+              </a:rPr>
+              <a:t>[registro_qualificacao3]</a:t>
+            </a:r>
           </a:p>
           <a:p>
             <a:pPr algn="ctr"/>
@@ -4221,44 +4260,10 @@
           </a:p>
           <a:p>
             <a:pPr algn="ctr"/>
-            <a:r>
-              <a:rPr lang="pt-BR" sz="700" dirty="0">
-                <a:latin typeface="Arial" panose="020B0604020202020204" pitchFamily="34" charset="0"/>
-                <a:cs typeface="Arial" panose="020B0604020202020204" pitchFamily="34" charset="0"/>
-              </a:rPr>
-              <a:t>_________________________________________</a:t>
-            </a:r>
-          </a:p>
-          <a:p>
-            <a:pPr algn="ctr"/>
-            <a:r>
-              <a:rPr lang="es-ES" sz="700" b="1" dirty="0">
-                <a:latin typeface="Arial"/>
-                <a:cs typeface="Arial"/>
-              </a:rPr>
-              <a:t>[nome3]</a:t>
-            </a:r>
-          </a:p>
-          <a:p>
-            <a:pPr algn="ctr"/>
-            <a:r>
-              <a:rPr lang="pt-BR" sz="700" dirty="0">
-                <a:latin typeface="Arial"/>
-                <a:cs typeface="Arial"/>
-              </a:rPr>
-              <a:t>[qualificacao_profissional3]</a:t>
-            </a:r>
-          </a:p>
-          <a:p>
-            <a:pPr algn="ctr"/>
-            <a:r>
-              <a:rPr lang="pt-BR" sz="700" dirty="0">
-                <a:latin typeface="Arial"/>
-                <a:cs typeface="Arial"/>
-              </a:rPr>
-              <a:t>[registro_profissional3</a:t>
-            </a:r>
-            <a:endParaRPr lang="pt-BR" dirty="0"/>
+            <a:endParaRPr lang="pt-BR" sz="700" b="1" dirty="0">
+              <a:latin typeface="Arial" panose="020B0604020202020204" pitchFamily="34" charset="0"/>
+              <a:cs typeface="Arial" panose="020B0604020202020204" pitchFamily="34" charset="0"/>
+            </a:endParaRPr>
           </a:p>
         </p:txBody>
       </p:sp>

</xml_diff>